<commit_message>
Slides for final lecture
</commit_message>
<xml_diff>
--- a/lectures/01-introduction.pptx
+++ b/lectures/01-introduction.pptx
@@ -3157,6 +3157,83 @@
               <a:rPr lang="en-US" sz="2000" dirty="0"/>
               <a:t>Lars Ailo Bongo (larsab@cs.uit.no)</a:t>
             </a:r>
+          </a:p>
+        </p:txBody>
+      </p:sp>
+      <p:pic>
+        <p:nvPicPr>
+          <p:cNvPr id="4" name="Picture 3">
+            <a:extLst>
+              <a:ext uri="{FF2B5EF4-FFF2-40B4-BE49-F238E27FC236}">
+                <a16:creationId xmlns:a16="http://schemas.microsoft.com/office/drawing/2014/main" id="{95429566-76C3-42A1-A10E-9138F5DC2D8E}"/>
+              </a:ext>
+            </a:extLst>
+          </p:cNvPr>
+          <p:cNvPicPr>
+            <a:picLocks noChangeAspect="1"/>
+          </p:cNvPicPr>
+          <p:nvPr/>
+        </p:nvPicPr>
+        <p:blipFill>
+          <a:blip r:embed="rId2"/>
+          <a:stretch>
+            <a:fillRect/>
+          </a:stretch>
+        </p:blipFill>
+        <p:spPr>
+          <a:xfrm>
+            <a:off x="2283160" y="0"/>
+            <a:ext cx="6860840" cy="2947955"/>
+          </a:xfrm>
+          <a:prstGeom prst="rect">
+            <a:avLst/>
+          </a:prstGeom>
+        </p:spPr>
+      </p:pic>
+      <p:sp>
+        <p:nvSpPr>
+          <p:cNvPr id="5" name="Arrow: Up 4">
+            <a:extLst>
+              <a:ext uri="{FF2B5EF4-FFF2-40B4-BE49-F238E27FC236}">
+                <a16:creationId xmlns:a16="http://schemas.microsoft.com/office/drawing/2014/main" id="{4DD49500-7902-4EB9-AB29-9A75836C7F94}"/>
+              </a:ext>
+            </a:extLst>
+          </p:cNvPr>
+          <p:cNvSpPr/>
+          <p:nvPr/>
+        </p:nvSpPr>
+        <p:spPr>
+          <a:xfrm rot="5400000">
+            <a:off x="1992735" y="1064904"/>
+            <a:ext cx="1113183" cy="2520161"/>
+          </a:xfrm>
+          <a:prstGeom prst="upArrow">
+            <a:avLst/>
+          </a:prstGeom>
+          <a:solidFill>
+            <a:srgbClr val="FF0000"/>
+          </a:solidFill>
+        </p:spPr>
+        <p:style>
+          <a:lnRef idx="1">
+            <a:schemeClr val="accent1"/>
+          </a:lnRef>
+          <a:fillRef idx="3">
+            <a:schemeClr val="accent1"/>
+          </a:fillRef>
+          <a:effectRef idx="2">
+            <a:schemeClr val="accent1"/>
+          </a:effectRef>
+          <a:fontRef idx="minor">
+            <a:schemeClr val="lt1"/>
+          </a:fontRef>
+        </p:style>
+        <p:txBody>
+          <a:bodyPr rtlCol="0" anchor="ctr"/>
+          <a:lstStyle/>
+          <a:p>
+            <a:pPr algn="ctr"/>
+            <a:endParaRPr lang="en-US" dirty="0"/>
           </a:p>
         </p:txBody>
       </p:sp>

</xml_diff>